<commit_message>
change notes and slides
</commit_message>
<xml_diff>
--- a/lecture/18BERT.pptx
+++ b/lecture/18BERT.pptx
@@ -8,7 +8,7 @@
     <p:notesMasterId r:id="rId4"/>
   </p:notesMasterIdLst>
   <p:handoutMasterIdLst>
-    <p:handoutMasterId r:id="rId17"/>
+    <p:handoutMasterId r:id="rId18"/>
   </p:handoutMasterIdLst>
   <p:sldIdLst>
     <p:sldId id="256" r:id="rId3"/>
@@ -19,11 +19,12 @@
     <p:sldId id="266" r:id="rId9"/>
     <p:sldId id="269" r:id="rId10"/>
     <p:sldId id="265" r:id="rId11"/>
-    <p:sldId id="270" r:id="rId12"/>
-    <p:sldId id="260" r:id="rId13"/>
-    <p:sldId id="268" r:id="rId14"/>
-    <p:sldId id="261" r:id="rId15"/>
-    <p:sldId id="262" r:id="rId16"/>
+    <p:sldId id="278" r:id="rId12"/>
+    <p:sldId id="270" r:id="rId13"/>
+    <p:sldId id="260" r:id="rId14"/>
+    <p:sldId id="268" r:id="rId15"/>
+    <p:sldId id="261" r:id="rId16"/>
+    <p:sldId id="262" r:id="rId17"/>
   </p:sldIdLst>
   <p:sldSz cx="12192000" cy="6858000"/>
   <p:notesSz cx="7103745" cy="10234295"/>
@@ -713,6 +714,98 @@
 </file>
 
 <file path=ppt/notesSlides/notesSlide2.xml><?xml version="1.0" encoding="utf-8"?>
+<p:notes xmlns:a="http://schemas.openxmlformats.org/drawingml/2006/main" xmlns:r="http://schemas.openxmlformats.org/officeDocument/2006/relationships" xmlns:p="http://schemas.openxmlformats.org/presentationml/2006/main">
+  <p:cSld>
+    <p:spTree>
+      <p:nvGrpSpPr>
+        <p:cNvPr id="1" name=""/>
+        <p:cNvGrpSpPr/>
+        <p:nvPr/>
+      </p:nvGrpSpPr>
+      <p:grpSpPr/>
+      <p:sp>
+        <p:nvSpPr>
+          <p:cNvPr id="2" name="Slide Image Placeholder 1"/>
+          <p:cNvSpPr/>
+          <p:nvPr>
+            <p:ph type="sldImg" idx="2"/>
+          </p:nvPr>
+        </p:nvSpPr>
+        <p:spPr/>
+      </p:sp>
+      <p:sp>
+        <p:nvSpPr>
+          <p:cNvPr id="3" name="Text Placeholder 2"/>
+          <p:cNvSpPr/>
+          <p:nvPr>
+            <p:ph type="body" idx="3"/>
+          </p:nvPr>
+        </p:nvSpPr>
+        <p:spPr/>
+        <p:txBody>
+          <a:bodyPr/>
+          <a:p>
+            <a:r>
+              <a:rPr lang="en-US"/>
+              <a:t>BERT-base and BERT-large. Both models were pre-trained on the same datasets, which include the BooksCorpus (800 million words) and English Wikipedia (2,500 million words). In total, BERT models were pre-trained on approximately 3,300 million (3.3 billion) words.</a:t>
+            </a:r>
+            <a:endParaRPr lang="en-US"/>
+          </a:p>
+        </p:txBody>
+      </p:sp>
+    </p:spTree>
+  </p:cSld>
+  <p:clrMapOvr>
+    <a:masterClrMapping/>
+  </p:clrMapOvr>
+</p:notes>
+</file>
+
+<file path=ppt/notesSlides/notesSlide3.xml><?xml version="1.0" encoding="utf-8"?>
+<p:notes xmlns:a="http://schemas.openxmlformats.org/drawingml/2006/main" xmlns:r="http://schemas.openxmlformats.org/officeDocument/2006/relationships" xmlns:p="http://schemas.openxmlformats.org/presentationml/2006/main">
+  <p:cSld>
+    <p:spTree>
+      <p:nvGrpSpPr>
+        <p:cNvPr id="1" name=""/>
+        <p:cNvGrpSpPr/>
+        <p:nvPr/>
+      </p:nvGrpSpPr>
+      <p:grpSpPr/>
+      <p:sp>
+        <p:nvSpPr>
+          <p:cNvPr id="2" name="Slide Image Placeholder 1"/>
+          <p:cNvSpPr/>
+          <p:nvPr>
+            <p:ph type="sldImg" idx="2"/>
+          </p:nvPr>
+        </p:nvSpPr>
+        <p:spPr/>
+      </p:sp>
+      <p:sp>
+        <p:nvSpPr>
+          <p:cNvPr id="3" name="Text Placeholder 2"/>
+          <p:cNvSpPr/>
+          <p:nvPr>
+            <p:ph type="body" idx="3"/>
+          </p:nvPr>
+        </p:nvSpPr>
+        <p:spPr/>
+        <p:txBody>
+          <a:bodyPr/>
+          <a:p>
+            <a:endParaRPr lang="en-US"/>
+          </a:p>
+        </p:txBody>
+      </p:sp>
+    </p:spTree>
+  </p:cSld>
+  <p:clrMapOvr>
+    <a:masterClrMapping/>
+  </p:clrMapOvr>
+</p:notes>
+</file>
+
+<file path=ppt/notesSlides/notesSlide4.xml><?xml version="1.0" encoding="utf-8"?>
 <p:notes xmlns:a="http://schemas.openxmlformats.org/drawingml/2006/main" xmlns:r="http://schemas.openxmlformats.org/officeDocument/2006/relationships" xmlns:p="http://schemas.openxmlformats.org/presentationml/2006/main">
   <p:cSld>
     <p:spTree>
@@ -3841,12 +3934,12 @@
       </p:grpSpPr>
       <p:sp>
         <p:nvSpPr>
-          <p:cNvPr id="4" name="Title 3"/>
-          <p:cNvSpPr>
-            <a:spLocks noGrp="1"/>
-          </p:cNvSpPr>
-          <p:nvPr>
-            <p:ph type="ctrTitle"/>
+          <p:cNvPr id="2" name="Title 1"/>
+          <p:cNvSpPr>
+            <a:spLocks noGrp="1"/>
+          </p:cNvSpPr>
+          <p:nvPr>
+            <p:ph type="title"/>
           </p:nvPr>
         </p:nvSpPr>
         <p:spPr/>
@@ -3855,40 +3948,302 @@
           <a:lstStyle/>
           <a:p>
             <a:r>
-              <a:rPr lang="en-US"/>
-              <a:t>ELMo</a:t>
+              <a:rPr lang="en-US" dirty="0">
+                <a:ea typeface="Calibri"/>
+                <a:cs typeface="Calibri"/>
+              </a:rPr>
+              <a:t>implementation</a:t>
+            </a:r>
+            <a:endParaRPr lang="en-US" dirty="0"/>
+          </a:p>
+        </p:txBody>
+      </p:sp>
+      <p:sp>
+        <p:nvSpPr>
+          <p:cNvPr id="3" name="Content Placeholder 2"/>
+          <p:cNvSpPr>
+            <a:spLocks noGrp="1"/>
+          </p:cNvSpPr>
+          <p:nvPr>
+            <p:ph idx="1"/>
+          </p:nvPr>
+        </p:nvSpPr>
+        <p:spPr/>
+        <p:txBody>
+          <a:bodyPr vert="horz" lIns="91440" tIns="45720" rIns="91440" bIns="45720" rtlCol="0" anchor="t">
+            <a:normAutofit lnSpcReduction="10000"/>
+          </a:bodyPr>
+          <a:lstStyle/>
+          <a:p>
+            <a:r>
+              <a:rPr lang="en-US" dirty="0">
+                <a:ea typeface="+mn-lt"/>
+                <a:cs typeface="+mn-lt"/>
+                <a:hlinkClick r:id="rId1"/>
+              </a:rPr>
+              <a:t>BERT FineTuning with Cloud TPUs</a:t>
+            </a:r>
+            <a:r>
+              <a:rPr lang="en-US" dirty="0">
+                <a:ea typeface="+mn-lt"/>
+                <a:cs typeface="+mn-lt"/>
+              </a:rPr>
+              <a:t> notebook </a:t>
+            </a:r>
+            <a:endParaRPr lang="en-US">
+              <a:ea typeface="+mn-lt"/>
+              <a:cs typeface="+mn-lt"/>
+            </a:endParaRPr>
+          </a:p>
+          <a:p>
+            <a:endParaRPr lang="en-US" dirty="0">
+              <a:ea typeface="Calibri"/>
+              <a:cs typeface="Calibri"/>
+            </a:endParaRPr>
+          </a:p>
+          <a:p>
+            <a:r>
+              <a:rPr lang="en-US">
+                <a:ea typeface="+mn-lt"/>
+                <a:cs typeface="+mn-lt"/>
+              </a:rPr>
+              <a:t>code in the </a:t>
+            </a:r>
+            <a:r>
+              <a:rPr lang="en-US" dirty="0">
+                <a:ea typeface="+mn-lt"/>
+                <a:cs typeface="+mn-lt"/>
+                <a:hlinkClick r:id="rId2"/>
+              </a:rPr>
+              <a:t>BERT repo</a:t>
+            </a:r>
+            <a:r>
+              <a:rPr lang="en-US" dirty="0">
+                <a:ea typeface="+mn-lt"/>
+                <a:cs typeface="+mn-lt"/>
+              </a:rPr>
+              <a:t>:</a:t>
+            </a:r>
+            <a:endParaRPr lang="en-US" dirty="0"/>
+          </a:p>
+          <a:p>
+            <a:pPr lvl="1" indent="-285750"/>
+            <a:r>
+              <a:rPr lang="en-US" dirty="0">
+                <a:ea typeface="+mn-lt"/>
+                <a:cs typeface="+mn-lt"/>
+                <a:hlinkClick r:id="rId3"/>
+              </a:rPr>
+              <a:t>modeling.py</a:t>
+            </a:r>
+            <a:r>
+              <a:rPr lang="en-US" dirty="0">
+                <a:ea typeface="+mn-lt"/>
+                <a:cs typeface="+mn-lt"/>
+              </a:rPr>
+              <a:t> constructed class </a:t>
+            </a:r>
+            <a:r>
+              <a:rPr lang="en-US" dirty="0" err="1">
+                <a:ea typeface="+mn-lt"/>
+                <a:cs typeface="+mn-lt"/>
+              </a:rPr>
+              <a:t>BertModel</a:t>
+            </a:r>
+            <a:r>
+              <a:rPr lang="en-US">
+                <a:ea typeface="+mn-lt"/>
+                <a:cs typeface="+mn-lt"/>
+              </a:rPr>
+              <a:t>, similar to a vanilla </a:t>
+            </a:r>
+            <a:r>
+              <a:rPr lang="en-US" dirty="0">
+                <a:ea typeface="+mn-lt"/>
+                <a:cs typeface="+mn-lt"/>
+              </a:rPr>
+              <a:t>Transformer encoder.</a:t>
+            </a:r>
+            <a:endParaRPr lang="en-US">
+              <a:ea typeface="Calibri"/>
+              <a:cs typeface="Calibri"/>
+            </a:endParaRPr>
+          </a:p>
+          <a:p>
+            <a:pPr lvl="1" indent="-285750"/>
+            <a:r>
+              <a:rPr lang="en-US" dirty="0">
+                <a:ea typeface="+mn-lt"/>
+                <a:cs typeface="+mn-lt"/>
+                <a:hlinkClick r:id="rId4"/>
+              </a:rPr>
+              <a:t>run_classifier.py</a:t>
+            </a:r>
+            <a:r>
+              <a:rPr lang="en-US" dirty="0">
+                <a:ea typeface="+mn-lt"/>
+                <a:cs typeface="+mn-lt"/>
+              </a:rPr>
+              <a:t> is an </a:t>
+            </a:r>
+            <a:r>
+              <a:rPr lang="en-US" err="1">
+                <a:ea typeface="+mn-lt"/>
+                <a:cs typeface="+mn-lt"/>
+              </a:rPr>
+              <a:t>e.g</a:t>
+            </a:r>
+            <a:r>
+              <a:rPr lang="en-US" dirty="0">
+                <a:ea typeface="+mn-lt"/>
+                <a:cs typeface="+mn-lt"/>
+              </a:rPr>
+              <a:t> of the fine-tuning. It also constructs the classification layer for the </a:t>
+            </a:r>
+            <a:r>
+              <a:rPr lang="en-US">
+                <a:ea typeface="+mn-lt"/>
+                <a:cs typeface="+mn-lt"/>
+              </a:rPr>
+              <a:t>supervised model. check out </a:t>
+            </a:r>
+            <a:r>
+              <a:rPr lang="en-US" dirty="0">
+                <a:ea typeface="+mn-lt"/>
+                <a:cs typeface="+mn-lt"/>
+              </a:rPr>
+              <a:t>the </a:t>
+            </a:r>
+            <a:r>
+              <a:rPr lang="en-US" dirty="0" err="1">
+                <a:ea typeface="+mn-lt"/>
+                <a:cs typeface="+mn-lt"/>
+              </a:rPr>
+              <a:t>create_model</a:t>
+            </a:r>
+            <a:r>
+              <a:rPr lang="en-US" dirty="0">
+                <a:ea typeface="+mn-lt"/>
+                <a:cs typeface="+mn-lt"/>
+              </a:rPr>
+              <a:t>() method in that file.</a:t>
+            </a:r>
+            <a:endParaRPr lang="en-US">
+              <a:ea typeface="Calibri"/>
+              <a:cs typeface="Calibri"/>
+            </a:endParaRPr>
+          </a:p>
+          <a:p>
+            <a:pPr lvl="1" indent="-285750"/>
+            <a:r>
+              <a:rPr lang="en-US">
+                <a:ea typeface="+mn-lt"/>
+                <a:cs typeface="+mn-lt"/>
+              </a:rPr>
+              <a:t>pre-trained models are available for download.</a:t>
+            </a:r>
+            <a:endParaRPr lang="en-US">
+              <a:ea typeface="+mn-lt"/>
+              <a:cs typeface="+mn-lt"/>
+            </a:endParaRPr>
+          </a:p>
+          <a:p>
+            <a:pPr lvl="1" indent="-285750"/>
+            <a:r>
+              <a:rPr lang="en-US" dirty="0">
+                <a:ea typeface="+mn-lt"/>
+                <a:cs typeface="+mn-lt"/>
+                <a:hlinkClick r:id="rId5"/>
+              </a:rPr>
+              <a:t>tokenization.py</a:t>
+            </a:r>
+            <a:r>
+              <a:rPr lang="en-US">
+                <a:ea typeface="+mn-lt"/>
+                <a:cs typeface="+mn-lt"/>
+              </a:rPr>
+              <a:t> is the tokenizer. BERT look at words as </a:t>
+            </a:r>
+            <a:r>
+              <a:rPr lang="en-US" dirty="0">
+                <a:ea typeface="+mn-lt"/>
+                <a:cs typeface="+mn-lt"/>
+              </a:rPr>
+              <a:t>WordPieces.</a:t>
+            </a:r>
+            <a:endParaRPr lang="en-US" dirty="0">
+              <a:ea typeface="+mn-lt"/>
+              <a:cs typeface="+mn-lt"/>
+            </a:endParaRPr>
+          </a:p>
+          <a:p>
+            <a:pPr lvl="1" indent="-285750"/>
+            <a:r>
+              <a:rPr lang="en-US">
+                <a:ea typeface="+mn-lt"/>
+                <a:cs typeface="+mn-lt"/>
+              </a:rPr>
+              <a:t>Huggingface:  </a:t>
+            </a:r>
+            <a:r>
+              <a:rPr lang="en-US" dirty="0">
+                <a:ea typeface="+mn-lt"/>
+                <a:cs typeface="+mn-lt"/>
+                <a:hlinkClick r:id="rId6"/>
+              </a:rPr>
+              <a:t>PyTorch implementation of BERT</a:t>
+            </a:r>
+            <a:r>
+              <a:rPr lang="en-US" dirty="0">
+                <a:ea typeface="+mn-lt"/>
+                <a:cs typeface="+mn-lt"/>
+              </a:rPr>
+              <a:t>. </a:t>
             </a:r>
             <a:endParaRPr lang="en-US"/>
           </a:p>
-        </p:txBody>
-      </p:sp>
-      <p:sp>
-        <p:nvSpPr>
-          <p:cNvPr id="5" name="Subtitle 4"/>
-          <p:cNvSpPr>
-            <a:spLocks noGrp="1"/>
-          </p:cNvSpPr>
-          <p:nvPr>
-            <p:ph type="subTitle" idx="1"/>
-          </p:nvPr>
-        </p:nvSpPr>
-        <p:spPr/>
-        <p:txBody>
-          <a:bodyPr/>
-          <a:lstStyle/>
-          <a:p>
-            <a:r>
-              <a:rPr lang="en-US"/>
-              <a:t>Embeddings from Language Models</a:t>
-            </a:r>
-            <a:endParaRPr lang="en-US"/>
-          </a:p>
-          <a:p>
-            <a:r>
-              <a:rPr lang="en-US"/>
-              <a:t>BiLSTM</a:t>
-            </a:r>
-            <a:endParaRPr lang="en-US"/>
+          <a:p>
+            <a:pPr lvl="2"/>
+            <a:r>
+              <a:rPr lang="en-US" dirty="0">
+                <a:ea typeface="+mn-lt"/>
+                <a:cs typeface="+mn-lt"/>
+                <a:hlinkClick r:id="rId7"/>
+              </a:rPr>
+              <a:t>AllenNLP</a:t>
+            </a:r>
+            <a:r>
+              <a:rPr lang="en-US" dirty="0">
+                <a:ea typeface="+mn-lt"/>
+                <a:cs typeface="+mn-lt"/>
+              </a:rPr>
+              <a:t> library </a:t>
+            </a:r>
+            <a:r>
+              <a:rPr lang="en-US" dirty="0">
+                <a:ea typeface="+mn-lt"/>
+                <a:cs typeface="+mn-lt"/>
+                <a:hlinkClick r:id="rId8"/>
+              </a:rPr>
+              <a:t>allow using BERT embeddings</a:t>
+            </a:r>
+            <a:r>
+              <a:rPr lang="en-US" dirty="0">
+                <a:ea typeface="+mn-lt"/>
+                <a:cs typeface="+mn-lt"/>
+              </a:rPr>
+              <a:t> with any model.</a:t>
+            </a:r>
+            <a:endParaRPr lang="en-US" dirty="0">
+              <a:ea typeface="Calibri"/>
+              <a:cs typeface="Calibri"/>
+            </a:endParaRPr>
+          </a:p>
+          <a:p>
+            <a:endParaRPr lang="en-US" dirty="0">
+              <a:ea typeface="Calibri"/>
+              <a:cs typeface="Calibri"/>
+            </a:endParaRPr>
           </a:p>
         </p:txBody>
       </p:sp>
@@ -3919,12 +4274,12 @@
       </p:grpSpPr>
       <p:sp>
         <p:nvSpPr>
-          <p:cNvPr id="2" name="Title 1"/>
-          <p:cNvSpPr>
-            <a:spLocks noGrp="1"/>
-          </p:cNvSpPr>
-          <p:nvPr>
-            <p:ph type="title"/>
+          <p:cNvPr id="4" name="Title 3"/>
+          <p:cNvSpPr>
+            <a:spLocks noGrp="1"/>
+          </p:cNvSpPr>
+          <p:nvPr>
+            <p:ph type="ctrTitle"/>
           </p:nvPr>
         </p:nvSpPr>
         <p:spPr/>
@@ -3933,148 +4288,40 @@
           <a:lstStyle/>
           <a:p>
             <a:r>
-              <a:rPr lang="en-US" dirty="0">
-                <a:ea typeface="+mj-lt"/>
-                <a:cs typeface="+mj-lt"/>
-              </a:rPr>
-              <a:t>Contextualized word-embedding</a:t>
-            </a:r>
-            <a:endParaRPr lang="en-US" dirty="0"/>
-          </a:p>
-        </p:txBody>
-      </p:sp>
-      <p:pic>
-        <p:nvPicPr>
-          <p:cNvPr id="4" name="Picture 4" descr="Text&#10;&#10;Description automatically generated"/>
-          <p:cNvPicPr>
-            <a:picLocks noGrp="1" noChangeAspect="1"/>
-          </p:cNvPicPr>
-          <p:nvPr>
-            <p:ph idx="1"/>
-          </p:nvPr>
-        </p:nvPicPr>
-        <p:blipFill>
-          <a:blip r:embed="rId1"/>
-          <a:stretch>
-            <a:fillRect/>
-          </a:stretch>
-        </p:blipFill>
-        <p:spPr>
-          <a:xfrm>
-            <a:off x="4091233" y="2935494"/>
-            <a:ext cx="5508685" cy="3241469"/>
-          </a:xfrm>
-        </p:spPr>
-      </p:pic>
-      <p:sp>
-        <p:nvSpPr>
-          <p:cNvPr id="5" name="TextBox 4"/>
-          <p:cNvSpPr txBox="1"/>
-          <p:nvPr/>
-        </p:nvSpPr>
-        <p:spPr>
-          <a:xfrm>
-            <a:off x="649357" y="1585291"/>
-            <a:ext cx="8938590" cy="1200329"/>
-          </a:xfrm>
-          <a:prstGeom prst="rect">
-            <a:avLst/>
-          </a:prstGeom>
-          <a:noFill/>
-        </p:spPr>
-        <p:txBody>
-          <a:bodyPr rot="0" spcFirstLastPara="0" vertOverflow="overflow" horzOverflow="overflow" vert="horz" wrap="square" lIns="91440" tIns="45720" rIns="91440" bIns="45720" numCol="1" spcCol="0" rtlCol="0" fromWordArt="0" anchor="t" anchorCtr="0" forceAA="0" compatLnSpc="1">
-            <a:spAutoFit/>
-          </a:bodyPr>
+              <a:rPr lang="en-US"/>
+              <a:t>ELMo</a:t>
+            </a:r>
+            <a:endParaRPr lang="en-US"/>
+          </a:p>
+        </p:txBody>
+      </p:sp>
+      <p:sp>
+        <p:nvSpPr>
+          <p:cNvPr id="5" name="Subtitle 4"/>
+          <p:cNvSpPr>
+            <a:spLocks noGrp="1"/>
+          </p:cNvSpPr>
+          <p:nvPr>
+            <p:ph type="subTitle" idx="1"/>
+          </p:nvPr>
+        </p:nvSpPr>
+        <p:spPr/>
+        <p:txBody>
+          <a:bodyPr/>
           <a:lstStyle/>
           <a:p>
-            <a:pPr marL="285750" indent="-285750">
-              <a:buFont typeface="Arial" panose="020B0604020202020204"/>
-              <a:buChar char="•"/>
-            </a:pPr>
-            <a:r>
-              <a:rPr lang="en-US" dirty="0">
-                <a:solidFill>
-                  <a:srgbClr val="000000"/>
-                </a:solidFill>
-                <a:latin typeface="Helvetica"/>
-                <a:cs typeface="Helvetica"/>
-              </a:rPr>
-              <a:t>Different from word2vec and </a:t>
-            </a:r>
-            <a:r>
-              <a:rPr lang="en-US" dirty="0" err="1">
-                <a:solidFill>
-                  <a:srgbClr val="000000"/>
-                </a:solidFill>
-                <a:latin typeface="Helvetica"/>
-                <a:cs typeface="Helvetica"/>
-              </a:rPr>
-              <a:t>GloVe</a:t>
-            </a:r>
-            <a:r>
-              <a:rPr lang="en-US" dirty="0">
-                <a:solidFill>
-                  <a:srgbClr val="000000"/>
-                </a:solidFill>
-                <a:latin typeface="Helvetica"/>
-                <a:cs typeface="Helvetica"/>
-              </a:rPr>
-              <a:t>, which give a </a:t>
-            </a:r>
-            <a:r>
-              <a:rPr lang="en-US" dirty="0">
-                <a:solidFill>
-                  <a:srgbClr val="000000"/>
-                </a:solidFill>
-                <a:highlight>
-                  <a:srgbClr val="FFFF00"/>
-                </a:highlight>
-                <a:latin typeface="Helvetica"/>
-                <a:cs typeface="Helvetica"/>
-              </a:rPr>
-              <a:t>fixed </a:t>
-            </a:r>
-            <a:r>
-              <a:rPr lang="en-US" dirty="0">
-                <a:solidFill>
-                  <a:srgbClr val="000000"/>
-                </a:solidFill>
-                <a:latin typeface="Helvetica"/>
-                <a:cs typeface="Helvetica"/>
-              </a:rPr>
-              <a:t>embedding for a word in different context</a:t>
-            </a:r>
-            <a:endParaRPr lang="en-US" dirty="0">
-              <a:solidFill>
-                <a:srgbClr val="000000"/>
-              </a:solidFill>
-              <a:latin typeface="Helvetica"/>
-              <a:cs typeface="Helvetica"/>
-            </a:endParaRPr>
-          </a:p>
-          <a:p>
-            <a:pPr marL="285750" indent="-285750">
-              <a:buFont typeface="Arial" panose="020B0604020202020204"/>
-              <a:buChar char="•"/>
-            </a:pPr>
-            <a:r>
-              <a:rPr lang="en-US" dirty="0">
-                <a:solidFill>
-                  <a:srgbClr val="000000"/>
-                </a:solidFill>
-                <a:latin typeface="Helvetica"/>
-                <a:cs typeface="Helvetica"/>
-              </a:rPr>
-              <a:t>Contextualized word-embeddings can give different embeddings for a word based on the meaning they carry in the context</a:t>
-            </a:r>
-            <a:endParaRPr lang="en-US" dirty="0">
-              <a:solidFill>
-                <a:srgbClr val="000000"/>
-              </a:solidFill>
-              <a:ea typeface="Calibri"/>
-              <a:cs typeface="Calibri"/>
-            </a:endParaRPr>
+            <a:r>
+              <a:rPr lang="en-US"/>
+              <a:t>Embeddings from Language Models</a:t>
+            </a:r>
+            <a:endParaRPr lang="en-US"/>
+          </a:p>
+          <a:p>
+            <a:r>
+              <a:rPr lang="en-US"/>
+              <a:t>BiLSTM</a:t>
+            </a:r>
+            <a:endParaRPr lang="en-US"/>
           </a:p>
         </p:txBody>
       </p:sp>
@@ -4119,6 +4366,192 @@
           <a:lstStyle/>
           <a:p>
             <a:r>
+              <a:rPr lang="en-US" dirty="0">
+                <a:ea typeface="+mj-lt"/>
+                <a:cs typeface="+mj-lt"/>
+              </a:rPr>
+              <a:t>Contextualized word-embedding</a:t>
+            </a:r>
+            <a:endParaRPr lang="en-US" dirty="0"/>
+          </a:p>
+        </p:txBody>
+      </p:sp>
+      <p:pic>
+        <p:nvPicPr>
+          <p:cNvPr id="4" name="Picture 4" descr="Text&#10;&#10;Description automatically generated"/>
+          <p:cNvPicPr>
+            <a:picLocks noGrp="1" noChangeAspect="1"/>
+          </p:cNvPicPr>
+          <p:nvPr>
+            <p:ph idx="1"/>
+          </p:nvPr>
+        </p:nvPicPr>
+        <p:blipFill>
+          <a:blip r:embed="rId1"/>
+          <a:stretch>
+            <a:fillRect/>
+          </a:stretch>
+        </p:blipFill>
+        <p:spPr>
+          <a:xfrm>
+            <a:off x="4091233" y="2935494"/>
+            <a:ext cx="5508685" cy="3241469"/>
+          </a:xfrm>
+        </p:spPr>
+      </p:pic>
+      <p:sp>
+        <p:nvSpPr>
+          <p:cNvPr id="5" name="TextBox 4"/>
+          <p:cNvSpPr txBox="1"/>
+          <p:nvPr/>
+        </p:nvSpPr>
+        <p:spPr>
+          <a:xfrm>
+            <a:off x="649357" y="1585291"/>
+            <a:ext cx="8938590" cy="1200329"/>
+          </a:xfrm>
+          <a:prstGeom prst="rect">
+            <a:avLst/>
+          </a:prstGeom>
+          <a:noFill/>
+        </p:spPr>
+        <p:txBody>
+          <a:bodyPr rot="0" spcFirstLastPara="0" vertOverflow="overflow" horzOverflow="overflow" vert="horz" wrap="square" lIns="91440" tIns="45720" rIns="91440" bIns="45720" numCol="1" spcCol="0" rtlCol="0" fromWordArt="0" anchor="t" anchorCtr="0" forceAA="0" compatLnSpc="1">
+            <a:spAutoFit/>
+          </a:bodyPr>
+          <a:lstStyle/>
+          <a:p>
+            <a:pPr marL="285750" indent="-285750">
+              <a:buFont typeface="Arial" panose="020B0604020202020204"/>
+              <a:buChar char="•"/>
+            </a:pPr>
+            <a:r>
+              <a:rPr lang="en-US" dirty="0">
+                <a:solidFill>
+                  <a:srgbClr val="000000"/>
+                </a:solidFill>
+                <a:latin typeface="Helvetica"/>
+                <a:cs typeface="Helvetica"/>
+              </a:rPr>
+              <a:t>Different from word2vec and </a:t>
+            </a:r>
+            <a:r>
+              <a:rPr lang="en-US" dirty="0" err="1">
+                <a:solidFill>
+                  <a:srgbClr val="000000"/>
+                </a:solidFill>
+                <a:latin typeface="Helvetica"/>
+                <a:cs typeface="Helvetica"/>
+              </a:rPr>
+              <a:t>GloVe</a:t>
+            </a:r>
+            <a:r>
+              <a:rPr lang="en-US" dirty="0">
+                <a:solidFill>
+                  <a:srgbClr val="000000"/>
+                </a:solidFill>
+                <a:latin typeface="Helvetica"/>
+                <a:cs typeface="Helvetica"/>
+              </a:rPr>
+              <a:t>, which give a </a:t>
+            </a:r>
+            <a:r>
+              <a:rPr lang="en-US" dirty="0">
+                <a:solidFill>
+                  <a:srgbClr val="000000"/>
+                </a:solidFill>
+                <a:highlight>
+                  <a:srgbClr val="FFFF00"/>
+                </a:highlight>
+                <a:latin typeface="Helvetica"/>
+                <a:cs typeface="Helvetica"/>
+              </a:rPr>
+              <a:t>fixed </a:t>
+            </a:r>
+            <a:r>
+              <a:rPr lang="en-US" dirty="0">
+                <a:solidFill>
+                  <a:srgbClr val="000000"/>
+                </a:solidFill>
+                <a:latin typeface="Helvetica"/>
+                <a:cs typeface="Helvetica"/>
+              </a:rPr>
+              <a:t>embedding for a word in different context</a:t>
+            </a:r>
+            <a:endParaRPr lang="en-US" dirty="0">
+              <a:solidFill>
+                <a:srgbClr val="000000"/>
+              </a:solidFill>
+              <a:latin typeface="Helvetica"/>
+              <a:cs typeface="Helvetica"/>
+            </a:endParaRPr>
+          </a:p>
+          <a:p>
+            <a:pPr marL="285750" indent="-285750">
+              <a:buFont typeface="Arial" panose="020B0604020202020204"/>
+              <a:buChar char="•"/>
+            </a:pPr>
+            <a:r>
+              <a:rPr lang="en-US" dirty="0">
+                <a:solidFill>
+                  <a:srgbClr val="000000"/>
+                </a:solidFill>
+                <a:latin typeface="Helvetica"/>
+                <a:cs typeface="Helvetica"/>
+              </a:rPr>
+              <a:t>Contextualized word-embeddings can give different embeddings for a word based on the meaning they carry in the context</a:t>
+            </a:r>
+            <a:endParaRPr lang="en-US" dirty="0">
+              <a:solidFill>
+                <a:srgbClr val="000000"/>
+              </a:solidFill>
+              <a:ea typeface="Calibri"/>
+              <a:cs typeface="Calibri"/>
+            </a:endParaRPr>
+          </a:p>
+        </p:txBody>
+      </p:sp>
+    </p:spTree>
+  </p:cSld>
+  <p:clrMapOvr>
+    <a:masterClrMapping/>
+  </p:clrMapOvr>
+</p:sld>
+</file>
+
+<file path=ppt/slides/slide13.xml><?xml version="1.0" encoding="utf-8"?>
+<p:sld xmlns:a="http://schemas.openxmlformats.org/drawingml/2006/main" xmlns:r="http://schemas.openxmlformats.org/officeDocument/2006/relationships" xmlns:p="http://schemas.openxmlformats.org/presentationml/2006/main">
+  <p:cSld>
+    <p:spTree>
+      <p:nvGrpSpPr>
+        <p:cNvPr id="1" name=""/>
+        <p:cNvGrpSpPr/>
+        <p:nvPr/>
+      </p:nvGrpSpPr>
+      <p:grpSpPr>
+        <a:xfrm>
+          <a:off x="0" y="0"/>
+          <a:ext cx="0" cy="0"/>
+          <a:chOff x="0" y="0"/>
+          <a:chExt cx="0" cy="0"/>
+        </a:xfrm>
+      </p:grpSpPr>
+      <p:sp>
+        <p:nvSpPr>
+          <p:cNvPr id="2" name="Title 1"/>
+          <p:cNvSpPr>
+            <a:spLocks noGrp="1"/>
+          </p:cNvSpPr>
+          <p:nvPr>
+            <p:ph type="title"/>
+          </p:nvPr>
+        </p:nvSpPr>
+        <p:spPr/>
+        <p:txBody>
+          <a:bodyPr/>
+          <a:lstStyle/>
+          <a:p>
+            <a:r>
               <a:rPr lang="en-US"/>
               <a:t>architecture: bi-directional LSTM</a:t>
             </a:r>
@@ -4282,7 +4715,7 @@
 </p:sld>
 </file>
 
-<file path=ppt/slides/slide13.xml><?xml version="1.0" encoding="utf-8"?>
+<file path=ppt/slides/slide14.xml><?xml version="1.0" encoding="utf-8"?>
 <p:sld xmlns:a="http://schemas.openxmlformats.org/drawingml/2006/main" xmlns:r="http://schemas.openxmlformats.org/officeDocument/2006/relationships" xmlns:p="http://schemas.openxmlformats.org/presentationml/2006/main">
   <p:cSld>
     <p:spTree>
@@ -4582,6 +5015,111 @@
           </a:prstGeom>
         </p:spPr>
       </p:pic>
+      <p:sp>
+        <p:nvSpPr>
+          <p:cNvPr id="5" name="Text Box 4"/>
+          <p:cNvSpPr txBox="1"/>
+          <p:nvPr/>
+        </p:nvSpPr>
+        <p:spPr>
+          <a:xfrm>
+            <a:off x="2109470" y="5088255"/>
+            <a:ext cx="806450" cy="337185"/>
+          </a:xfrm>
+          <a:prstGeom prst="rect">
+            <a:avLst/>
+          </a:prstGeom>
+          <a:noFill/>
+        </p:spPr>
+        <p:txBody>
+          <a:bodyPr wrap="none" rtlCol="0">
+            <a:spAutoFit/>
+          </a:bodyPr>
+          <a:p>
+            <a:pPr algn="ctr"/>
+            <a:r>
+              <a:rPr lang="en-US" sz="800"/>
+              <a:t>BooksCorpus</a:t>
+            </a:r>
+            <a:endParaRPr lang="en-US" sz="800"/>
+          </a:p>
+          <a:p>
+            <a:pPr algn="ctr"/>
+            <a:r>
+              <a:rPr lang="en-US" sz="800"/>
+              <a:t>800M</a:t>
+            </a:r>
+            <a:endParaRPr lang="en-US" sz="800"/>
+          </a:p>
+        </p:txBody>
+      </p:sp>
+      <p:sp>
+        <p:nvSpPr>
+          <p:cNvPr id="6" name="Text Box 5"/>
+          <p:cNvSpPr txBox="1"/>
+          <p:nvPr/>
+        </p:nvSpPr>
+        <p:spPr>
+          <a:xfrm>
+            <a:off x="3977958" y="5008880"/>
+            <a:ext cx="664210" cy="306705"/>
+          </a:xfrm>
+          <a:prstGeom prst="rect">
+            <a:avLst/>
+          </a:prstGeom>
+          <a:noFill/>
+        </p:spPr>
+        <p:txBody>
+          <a:bodyPr wrap="none" rtlCol="0">
+            <a:spAutoFit/>
+          </a:bodyPr>
+          <a:p>
+            <a:pPr algn="ctr"/>
+            <a:r>
+              <a:rPr lang="en-US" sz="700"/>
+              <a:t>English Wiki</a:t>
+            </a:r>
+            <a:endParaRPr lang="en-US" sz="700"/>
+          </a:p>
+          <a:p>
+            <a:pPr algn="ctr"/>
+            <a:r>
+              <a:rPr lang="en-US" sz="700"/>
+              <a:t>2500M</a:t>
+            </a:r>
+            <a:endParaRPr lang="en-US" sz="700"/>
+          </a:p>
+        </p:txBody>
+      </p:sp>
+      <p:sp>
+        <p:nvSpPr>
+          <p:cNvPr id="7" name="Text Box 6"/>
+          <p:cNvSpPr txBox="1"/>
+          <p:nvPr/>
+        </p:nvSpPr>
+        <p:spPr>
+          <a:xfrm>
+            <a:off x="1773555" y="4858385"/>
+            <a:ext cx="419735" cy="229870"/>
+          </a:xfrm>
+          <a:prstGeom prst="rect">
+            <a:avLst/>
+          </a:prstGeom>
+          <a:noFill/>
+        </p:spPr>
+        <p:txBody>
+          <a:bodyPr wrap="none" rtlCol="0">
+            <a:spAutoFit/>
+          </a:bodyPr>
+          <a:p>
+            <a:r>
+              <a:rPr lang="en-US" sz="900"/>
+              <a:t>3.3B</a:t>
+            </a:r>
+            <a:endParaRPr lang="en-US" sz="900"/>
+          </a:p>
+        </p:txBody>
+      </p:sp>
     </p:spTree>
   </p:cSld>
   <p:clrMapOvr>
@@ -4810,7 +5348,7 @@
         </p:blipFill>
         <p:spPr>
           <a:xfrm>
-            <a:off x="1861728" y="1330243"/>
+            <a:off x="2815498" y="1095928"/>
             <a:ext cx="6906670" cy="2901397"/>
           </a:xfrm>
           <a:prstGeom prst="rect">
@@ -4824,11 +5362,15 @@
           <p:cNvGraphicFramePr>
             <a:graphicFrameLocks noGrp="1"/>
           </p:cNvGraphicFramePr>
-          <p:nvPr/>
+          <p:nvPr>
+            <p:custDataLst>
+              <p:tags r:id="rId2"/>
+            </p:custDataLst>
+          </p:nvPr>
         </p:nvGraphicFramePr>
         <p:xfrm>
-          <a:off x="2481314" y="4614855"/>
-          <a:ext cx="6287400" cy="1483359"/>
+          <a:off x="2148840" y="3997325"/>
+          <a:ext cx="7513320" cy="2905760"/>
         </p:xfrm>
         <a:graphic>
           <a:graphicData uri="http://schemas.openxmlformats.org/drawingml/2006/table">
@@ -4837,11 +5379,11 @@
                 <a:tableStyleId>{93296810-A885-4BE3-A3E7-6D5BEEA58F35}</a:tableStyleId>
               </a:tblPr>
               <a:tblGrid>
-                <a:gridCol w="2095800"/>
-                <a:gridCol w="2095800"/>
-                <a:gridCol w="2095800"/>
+                <a:gridCol w="2504440"/>
+                <a:gridCol w="2504440"/>
+                <a:gridCol w="2504440"/>
               </a:tblGrid>
-              <a:tr h="370840">
+              <a:tr h="365760">
                 <a:tc>
                   <a:txBody>
                     <a:bodyPr/>
@@ -4881,7 +5423,7 @@
                   <a:tcPr/>
                 </a:tc>
               </a:tr>
-              <a:tr h="370840">
+              <a:tr h="365760">
                 <a:tc>
                   <a:txBody>
                     <a:bodyPr/>
@@ -4925,7 +5467,7 @@
                   <a:tcPr/>
                 </a:tc>
               </a:tr>
-              <a:tr h="370840">
+              <a:tr h="365760">
                 <a:tc>
                   <a:txBody>
                     <a:bodyPr/>
@@ -4978,7 +5520,7 @@
                   <a:tcPr/>
                 </a:tc>
               </a:tr>
-              <a:tr h="370840">
+              <a:tr h="365760">
                 <a:tc>
                   <a:txBody>
                     <a:bodyPr/>
@@ -5022,6 +5564,160 @@
                   <a:tcPr/>
                 </a:tc>
               </a:tr>
+              <a:tr h="365760">
+                <a:tc>
+                  <a:txBody>
+                    <a:bodyPr/>
+                    <a:p>
+                      <a:pPr>
+                        <a:buNone/>
+                      </a:pPr>
+                      <a:r>
+                        <a:rPr lang="en-US" dirty="0"/>
+                        <a:t># parameters</a:t>
+                      </a:r>
+                      <a:endParaRPr lang="en-US" dirty="0"/>
+                    </a:p>
+                  </a:txBody>
+                  <a:tcPr/>
+                </a:tc>
+                <a:tc>
+                  <a:txBody>
+                    <a:bodyPr/>
+                    <a:p>
+                      <a:pPr>
+                        <a:buNone/>
+                      </a:pPr>
+                      <a:r>
+                        <a:rPr lang="en-US" dirty="0"/>
+                        <a:t>110M</a:t>
+                      </a:r>
+                      <a:endParaRPr lang="en-US" dirty="0"/>
+                    </a:p>
+                  </a:txBody>
+                  <a:tcPr/>
+                </a:tc>
+                <a:tc>
+                  <a:txBody>
+                    <a:bodyPr/>
+                    <a:p>
+                      <a:pPr>
+                        <a:buNone/>
+                      </a:pPr>
+                      <a:r>
+                        <a:rPr lang="en-US" dirty="0"/>
+                        <a:t>340M</a:t>
+                      </a:r>
+                      <a:endParaRPr lang="en-US" dirty="0"/>
+                    </a:p>
+                  </a:txBody>
+                  <a:tcPr/>
+                </a:tc>
+              </a:tr>
+              <a:tr h="424180">
+                <a:tc>
+                  <a:txBody>
+                    <a:bodyPr/>
+                    <a:p>
+                      <a:pPr>
+                        <a:buNone/>
+                      </a:pPr>
+                      <a:r>
+                        <a:rPr lang="en-US" dirty="0"/>
+                        <a:t>Training compute</a:t>
+                      </a:r>
+                      <a:endParaRPr lang="en-US" dirty="0"/>
+                    </a:p>
+                  </a:txBody>
+                  <a:tcPr/>
+                </a:tc>
+                <a:tc>
+                  <a:txBody>
+                    <a:bodyPr/>
+                    <a:p>
+                      <a:pPr>
+                        <a:buNone/>
+                      </a:pPr>
+                      <a:r>
+                        <a:rPr lang="en-US" dirty="0"/>
+                        <a:t>4 cloud TPUs, 4 days</a:t>
+                      </a:r>
+                      <a:endParaRPr lang="en-US" dirty="0"/>
+                    </a:p>
+                  </a:txBody>
+                  <a:tcPr/>
+                </a:tc>
+                <a:tc>
+                  <a:txBody>
+                    <a:bodyPr/>
+                    <a:p>
+                      <a:pPr>
+                        <a:buNone/>
+                      </a:pPr>
+                      <a:r>
+                        <a:rPr lang="en-US" sz="1800" dirty="0">
+                          <a:sym typeface="+mn-ea"/>
+                        </a:rPr>
+                        <a:t>16 cloud TPUs, 4 days</a:t>
+                      </a:r>
+                      <a:endParaRPr lang="en-US" dirty="0"/>
+                    </a:p>
+                  </a:txBody>
+                  <a:tcPr/>
+                </a:tc>
+              </a:tr>
+              <a:tr h="436880">
+                <a:tc>
+                  <a:txBody>
+                    <a:bodyPr/>
+                    <a:p>
+                      <a:pPr>
+                        <a:buNone/>
+                      </a:pPr>
+                      <a:r>
+                        <a:rPr lang="en-US" dirty="0"/>
+                        <a:t>Usage compute</a:t>
+                      </a:r>
+                      <a:endParaRPr lang="en-US" dirty="0"/>
+                    </a:p>
+                  </a:txBody>
+                  <a:tcPr/>
+                </a:tc>
+                <a:tc>
+                  <a:txBody>
+                    <a:bodyPr/>
+                    <a:p>
+                      <a:pPr>
+                        <a:buNone/>
+                      </a:pPr>
+                      <a:r>
+                        <a:rPr lang="en-US" sz="1800" dirty="0">
+                          <a:sym typeface="+mn-ea"/>
+                        </a:rPr>
+                        <a:t>1GPU</a:t>
+                      </a:r>
+                      <a:endParaRPr lang="en-US" dirty="0"/>
+                    </a:p>
+                  </a:txBody>
+                  <a:tcPr/>
+                </a:tc>
+                <a:tc>
+                  <a:txBody>
+                    <a:bodyPr/>
+                    <a:p>
+                      <a:pPr>
+                        <a:buNone/>
+                      </a:pPr>
+                      <a:r>
+                        <a:rPr lang="en-US" dirty="0"/>
+                        <a:t>1TPU</a:t>
+                      </a:r>
+                      <a:endParaRPr lang="en-US" dirty="0"/>
+                    </a:p>
+                  </a:txBody>
+                  <a:tcPr/>
+                </a:tc>
+              </a:tr>
             </a:tbl>
           </a:graphicData>
         </a:graphic>
@@ -5090,8 +5786,8 @@
         </p:blipFill>
         <p:spPr>
           <a:xfrm>
-            <a:off x="5111750" y="2240280"/>
-            <a:ext cx="5631815" cy="1770380"/>
+            <a:off x="2602865" y="3566160"/>
+            <a:ext cx="7720330" cy="2426970"/>
           </a:xfrm>
           <a:prstGeom prst="rect">
             <a:avLst/>
@@ -5106,8 +5802,8 @@
         </p:nvSpPr>
         <p:spPr>
           <a:xfrm>
-            <a:off x="891540" y="2089785"/>
-            <a:ext cx="2571750" cy="1476375"/>
+            <a:off x="647700" y="1584325"/>
+            <a:ext cx="7004050" cy="1476375"/>
           </a:xfrm>
           <a:prstGeom prst="rect">
             <a:avLst/>
@@ -5115,7 +5811,7 @@
           <a:noFill/>
         </p:spPr>
         <p:txBody>
-          <a:bodyPr wrap="none" rtlCol="0">
+          <a:bodyPr wrap="square" rtlCol="0">
             <a:spAutoFit/>
           </a:bodyPr>
           <a:p>
@@ -5132,7 +5828,7 @@
             </a:pPr>
             <a:r>
               <a:rPr lang="en-US"/>
-              <a:t>token embedding</a:t>
+              <a:t>token embedding: first sentence start with [CLS], end with [SEP]</a:t>
             </a:r>
             <a:endParaRPr lang="en-US"/>
           </a:p>
@@ -5559,7 +6255,7 @@
         </p:blipFill>
         <p:spPr>
           <a:xfrm>
-            <a:off x="2680970" y="1825625"/>
+            <a:off x="4284345" y="1721485"/>
             <a:ext cx="6447790" cy="4351655"/>
           </a:xfrm>
           <a:prstGeom prst="rect">
@@ -5567,6 +6263,67 @@
           </a:prstGeom>
         </p:spPr>
       </p:pic>
+      <p:sp>
+        <p:nvSpPr>
+          <p:cNvPr id="3" name="Text Box 2"/>
+          <p:cNvSpPr txBox="1"/>
+          <p:nvPr/>
+        </p:nvSpPr>
+        <p:spPr>
+          <a:xfrm>
+            <a:off x="512445" y="1721485"/>
+            <a:ext cx="4667250" cy="1753235"/>
+          </a:xfrm>
+          <a:prstGeom prst="rect">
+            <a:avLst/>
+          </a:prstGeom>
+          <a:noFill/>
+        </p:spPr>
+        <p:txBody>
+          <a:bodyPr wrap="square" rtlCol="0" anchor="t">
+            <a:spAutoFit/>
+          </a:bodyPr>
+          <a:p>
+            <a:pPr marL="285750" indent="-285750">
+              <a:buFont typeface="Arial" panose="020B0604020202020204" pitchFamily="34" charset="0"/>
+              <a:buChar char="•"/>
+            </a:pPr>
+            <a:r>
+              <a:rPr lang="en-US"/>
+              <a:t>download a pre-trained BERT and start training it on some task.</a:t>
+            </a:r>
+            <a:endParaRPr lang="en-US"/>
+          </a:p>
+          <a:p>
+            <a:pPr marL="285750" indent="-285750">
+              <a:buFont typeface="Arial" panose="020B0604020202020204" pitchFamily="34" charset="0"/>
+              <a:buChar char="•"/>
+            </a:pPr>
+            <a:r>
+              <a:rPr lang="en-US"/>
+              <a:t>use [CLS] and [SEP] i</a:t>
+            </a:r>
+            <a:r>
+              <a:rPr lang="en-US">
+                <a:sym typeface="+mn-ea"/>
+              </a:rPr>
+              <a:t>nstead of [BOS] and [EOS]</a:t>
+            </a:r>
+            <a:endParaRPr lang="en-US"/>
+          </a:p>
+          <a:p>
+            <a:pPr marL="285750" indent="-285750">
+              <a:buFont typeface="Arial" panose="020B0604020202020204" pitchFamily="34" charset="0"/>
+              <a:buChar char="•"/>
+            </a:pPr>
+            <a:r>
+              <a:rPr lang="en-US"/>
+              <a:t>For two-sentence inputs, put a [SEP] between the two sentences.</a:t>
+            </a:r>
+            <a:endParaRPr lang="en-US"/>
+          </a:p>
+        </p:txBody>
+      </p:sp>
     </p:spTree>
   </p:cSld>
   <p:clrMapOvr>
@@ -5584,14 +6341,7 @@
         <p:cNvGrpSpPr/>
         <p:nvPr/>
       </p:nvGrpSpPr>
-      <p:grpSpPr>
-        <a:xfrm>
-          <a:off x="0" y="0"/>
-          <a:ext cx="0" cy="0"/>
-          <a:chOff x="0" y="0"/>
-          <a:chExt cx="0" cy="0"/>
-        </a:xfrm>
-      </p:grpSpPr>
+      <p:grpSpPr/>
       <p:sp>
         <p:nvSpPr>
           <p:cNvPr id="2" name="Title 1"/>
@@ -5602,308 +6352,603 @@
             <p:ph type="title"/>
           </p:nvPr>
         </p:nvSpPr>
-        <p:spPr/>
+        <p:spPr>
+          <a:xfrm>
+            <a:off x="302895" y="-35560"/>
+            <a:ext cx="10515600" cy="1325563"/>
+          </a:xfrm>
+        </p:spPr>
         <p:txBody>
           <a:bodyPr/>
-          <a:lstStyle/>
-          <a:p>
-            <a:r>
-              <a:rPr lang="en-US" dirty="0">
-                <a:ea typeface="Calibri"/>
-                <a:cs typeface="Calibri"/>
-              </a:rPr>
-              <a:t>implementation</a:t>
-            </a:r>
-            <a:endParaRPr lang="en-US" dirty="0"/>
-          </a:p>
-        </p:txBody>
-      </p:sp>
-      <p:sp>
-        <p:nvSpPr>
-          <p:cNvPr id="3" name="Content Placeholder 2"/>
-          <p:cNvSpPr>
-            <a:spLocks noGrp="1"/>
-          </p:cNvSpPr>
+          <a:p>
+            <a:r>
+              <a:rPr lang="en-US" sz="3600"/>
+              <a:t>sentiment analysis</a:t>
+            </a:r>
+            <a:endParaRPr lang="en-US" sz="3600"/>
+          </a:p>
+        </p:txBody>
+      </p:sp>
+      <p:pic>
+        <p:nvPicPr>
+          <p:cNvPr id="4" name="Content Placeholder 3"/>
+          <p:cNvPicPr>
+            <a:picLocks noChangeAspect="1"/>
+          </p:cNvPicPr>
           <p:nvPr>
             <p:ph idx="1"/>
           </p:nvPr>
-        </p:nvSpPr>
-        <p:spPr/>
-        <p:txBody>
-          <a:bodyPr vert="horz" lIns="91440" tIns="45720" rIns="91440" bIns="45720" rtlCol="0" anchor="t">
-            <a:normAutofit lnSpcReduction="10000"/>
+        </p:nvPicPr>
+        <p:blipFill>
+          <a:blip r:embed="rId1"/>
+          <a:srcRect b="82067"/>
+          <a:stretch>
+            <a:fillRect/>
+          </a:stretch>
+        </p:blipFill>
+        <p:spPr>
+          <a:xfrm>
+            <a:off x="1613535" y="6189980"/>
+            <a:ext cx="8583930" cy="492125"/>
+          </a:xfrm>
+          <a:prstGeom prst="rect">
+            <a:avLst/>
+          </a:prstGeom>
+        </p:spPr>
+      </p:pic>
+      <p:pic>
+        <p:nvPicPr>
+          <p:cNvPr id="5" name="Content Placeholder 3"/>
+          <p:cNvPicPr>
+            <a:picLocks noChangeAspect="1"/>
+          </p:cNvPicPr>
+          <p:nvPr/>
+        </p:nvPicPr>
+        <p:blipFill>
+          <a:blip r:embed="rId1"/>
+          <a:srcRect t="18889" b="56089"/>
+          <a:stretch>
+            <a:fillRect/>
+          </a:stretch>
+        </p:blipFill>
+        <p:spPr>
+          <a:xfrm>
+            <a:off x="1438275" y="3861435"/>
+            <a:ext cx="8934450" cy="715010"/>
+          </a:xfrm>
+          <a:prstGeom prst="rect">
+            <a:avLst/>
+          </a:prstGeom>
+        </p:spPr>
+      </p:pic>
+      <p:pic>
+        <p:nvPicPr>
+          <p:cNvPr id="6" name="Picture 5"/>
+          <p:cNvPicPr>
+            <a:picLocks noChangeAspect="1"/>
+          </p:cNvPicPr>
+          <p:nvPr/>
+        </p:nvPicPr>
+        <p:blipFill>
+          <a:blip r:embed="rId2"/>
+          <a:stretch>
+            <a:fillRect/>
+          </a:stretch>
+        </p:blipFill>
+        <p:spPr>
+          <a:xfrm>
+            <a:off x="4777105" y="4794250"/>
+            <a:ext cx="2638425" cy="1075690"/>
+          </a:xfrm>
+          <a:prstGeom prst="rect">
+            <a:avLst/>
+          </a:prstGeom>
+        </p:spPr>
+      </p:pic>
+      <p:pic>
+        <p:nvPicPr>
+          <p:cNvPr id="7" name="Content Placeholder 3"/>
+          <p:cNvPicPr>
+            <a:picLocks noChangeAspect="1"/>
+          </p:cNvPicPr>
+          <p:nvPr/>
+        </p:nvPicPr>
+        <p:blipFill>
+          <a:blip r:embed="rId3"/>
+          <a:srcRect t="42953" b="11901"/>
+          <a:stretch>
+            <a:fillRect/>
+          </a:stretch>
+        </p:blipFill>
+        <p:spPr>
+          <a:xfrm>
+            <a:off x="4933315" y="2161540"/>
+            <a:ext cx="3171825" cy="1621155"/>
+          </a:xfrm>
+          <a:prstGeom prst="rect">
+            <a:avLst/>
+          </a:prstGeom>
+        </p:spPr>
+      </p:pic>
+      <p:sp>
+        <p:nvSpPr>
+          <p:cNvPr id="9" name="Text Box 8"/>
+          <p:cNvSpPr txBox="1"/>
+          <p:nvPr/>
+        </p:nvSpPr>
+        <p:spPr>
+          <a:xfrm>
+            <a:off x="3387090" y="3102610"/>
+            <a:ext cx="768985" cy="306705"/>
+          </a:xfrm>
+          <a:prstGeom prst="rect">
+            <a:avLst/>
+          </a:prstGeom>
+          <a:noFill/>
+        </p:spPr>
+        <p:txBody>
+          <a:bodyPr wrap="none" rtlCol="0">
+            <a:spAutoFit/>
           </a:bodyPr>
-          <a:lstStyle/>
-          <a:p>
-            <a:r>
-              <a:rPr lang="en-US" dirty="0">
-                <a:ea typeface="+mn-lt"/>
-                <a:cs typeface="+mn-lt"/>
-                <a:hlinkClick r:id="rId1"/>
-              </a:rPr>
-              <a:t>BERT FineTuning with Cloud TPUs</a:t>
-            </a:r>
-            <a:r>
-              <a:rPr lang="en-US" dirty="0">
-                <a:ea typeface="+mn-lt"/>
-                <a:cs typeface="+mn-lt"/>
-              </a:rPr>
-              <a:t> notebook </a:t>
-            </a:r>
-            <a:endParaRPr lang="en-US">
-              <a:ea typeface="+mn-lt"/>
-              <a:cs typeface="+mn-lt"/>
-            </a:endParaRPr>
-          </a:p>
-          <a:p>
-            <a:endParaRPr lang="en-US" dirty="0">
-              <a:ea typeface="Calibri"/>
-              <a:cs typeface="Calibri"/>
-            </a:endParaRPr>
-          </a:p>
-          <a:p>
-            <a:r>
-              <a:rPr lang="en-US">
-                <a:ea typeface="+mn-lt"/>
-                <a:cs typeface="+mn-lt"/>
-              </a:rPr>
-              <a:t>code in the </a:t>
-            </a:r>
-            <a:r>
-              <a:rPr lang="en-US" dirty="0">
-                <a:ea typeface="+mn-lt"/>
-                <a:cs typeface="+mn-lt"/>
-                <a:hlinkClick r:id="rId2"/>
-              </a:rPr>
-              <a:t>BERT repo</a:t>
-            </a:r>
-            <a:r>
-              <a:rPr lang="en-US" dirty="0">
-                <a:ea typeface="+mn-lt"/>
-                <a:cs typeface="+mn-lt"/>
-              </a:rPr>
-              <a:t>:</a:t>
-            </a:r>
-            <a:endParaRPr lang="en-US" dirty="0"/>
-          </a:p>
-          <a:p>
-            <a:pPr lvl="1" indent="-285750"/>
-            <a:r>
-              <a:rPr lang="en-US" dirty="0">
-                <a:ea typeface="+mn-lt"/>
-                <a:cs typeface="+mn-lt"/>
-                <a:hlinkClick r:id="rId3"/>
-              </a:rPr>
-              <a:t>modeling.py</a:t>
-            </a:r>
-            <a:r>
-              <a:rPr lang="en-US" dirty="0">
-                <a:ea typeface="+mn-lt"/>
-                <a:cs typeface="+mn-lt"/>
-              </a:rPr>
-              <a:t> constructed class </a:t>
-            </a:r>
-            <a:r>
-              <a:rPr lang="en-US" dirty="0" err="1">
-                <a:ea typeface="+mn-lt"/>
-                <a:cs typeface="+mn-lt"/>
-              </a:rPr>
-              <a:t>BertModel</a:t>
-            </a:r>
-            <a:r>
-              <a:rPr lang="en-US">
-                <a:ea typeface="+mn-lt"/>
-                <a:cs typeface="+mn-lt"/>
-              </a:rPr>
-              <a:t>, similar to a vanilla </a:t>
-            </a:r>
-            <a:r>
-              <a:rPr lang="en-US" dirty="0">
-                <a:ea typeface="+mn-lt"/>
-                <a:cs typeface="+mn-lt"/>
-              </a:rPr>
-              <a:t>Transformer encoder.</a:t>
-            </a:r>
-            <a:endParaRPr lang="en-US">
-              <a:ea typeface="Calibri"/>
-              <a:cs typeface="Calibri"/>
-            </a:endParaRPr>
-          </a:p>
-          <a:p>
-            <a:pPr lvl="1" indent="-285750"/>
-            <a:r>
-              <a:rPr lang="en-US" dirty="0">
-                <a:ea typeface="+mn-lt"/>
-                <a:cs typeface="+mn-lt"/>
-                <a:hlinkClick r:id="rId4"/>
-              </a:rPr>
-              <a:t>run_classifier.py</a:t>
-            </a:r>
-            <a:r>
-              <a:rPr lang="en-US" dirty="0">
-                <a:ea typeface="+mn-lt"/>
-                <a:cs typeface="+mn-lt"/>
-              </a:rPr>
-              <a:t> is an </a:t>
-            </a:r>
-            <a:r>
-              <a:rPr lang="en-US" err="1">
-                <a:ea typeface="+mn-lt"/>
-                <a:cs typeface="+mn-lt"/>
-              </a:rPr>
-              <a:t>e.g</a:t>
-            </a:r>
-            <a:r>
-              <a:rPr lang="en-US" dirty="0">
-                <a:ea typeface="+mn-lt"/>
-                <a:cs typeface="+mn-lt"/>
-              </a:rPr>
-              <a:t> of the fine-tuning. It also constructs the classification layer for the </a:t>
-            </a:r>
-            <a:r>
-              <a:rPr lang="en-US">
-                <a:ea typeface="+mn-lt"/>
-                <a:cs typeface="+mn-lt"/>
-              </a:rPr>
-              <a:t>supervised model. check out </a:t>
-            </a:r>
-            <a:r>
-              <a:rPr lang="en-US" dirty="0">
-                <a:ea typeface="+mn-lt"/>
-                <a:cs typeface="+mn-lt"/>
-              </a:rPr>
-              <a:t>the </a:t>
-            </a:r>
-            <a:r>
-              <a:rPr lang="en-US" dirty="0" err="1">
-                <a:ea typeface="+mn-lt"/>
-                <a:cs typeface="+mn-lt"/>
-              </a:rPr>
-              <a:t>create_model</a:t>
-            </a:r>
-            <a:r>
-              <a:rPr lang="en-US" dirty="0">
-                <a:ea typeface="+mn-lt"/>
-                <a:cs typeface="+mn-lt"/>
-              </a:rPr>
-              <a:t>() method in that file.</a:t>
-            </a:r>
-            <a:endParaRPr lang="en-US">
-              <a:ea typeface="Calibri"/>
-              <a:cs typeface="Calibri"/>
-            </a:endParaRPr>
-          </a:p>
-          <a:p>
-            <a:pPr lvl="1" indent="-285750"/>
-            <a:r>
-              <a:rPr lang="en-US">
-                <a:ea typeface="+mn-lt"/>
-                <a:cs typeface="+mn-lt"/>
-              </a:rPr>
-              <a:t>pre-trained models are available for download.</a:t>
-            </a:r>
-            <a:endParaRPr lang="en-US">
-              <a:ea typeface="+mn-lt"/>
-              <a:cs typeface="+mn-lt"/>
-            </a:endParaRPr>
-          </a:p>
-          <a:p>
-            <a:pPr lvl="1" indent="-285750"/>
-            <a:r>
-              <a:rPr lang="en-US" dirty="0">
-                <a:ea typeface="+mn-lt"/>
-                <a:cs typeface="+mn-lt"/>
-                <a:hlinkClick r:id="rId5"/>
-              </a:rPr>
-              <a:t>tokenization.py</a:t>
-            </a:r>
-            <a:r>
-              <a:rPr lang="en-US">
-                <a:ea typeface="+mn-lt"/>
-                <a:cs typeface="+mn-lt"/>
-              </a:rPr>
-              <a:t> is the tokenizer. BERT look at words as </a:t>
-            </a:r>
-            <a:r>
-              <a:rPr lang="en-US" dirty="0">
-                <a:ea typeface="+mn-lt"/>
-                <a:cs typeface="+mn-lt"/>
-              </a:rPr>
-              <a:t>WordPieces.</a:t>
-            </a:r>
-            <a:endParaRPr lang="en-US" dirty="0">
-              <a:ea typeface="+mn-lt"/>
-              <a:cs typeface="+mn-lt"/>
-            </a:endParaRPr>
-          </a:p>
-          <a:p>
-            <a:pPr lvl="1" indent="-285750"/>
-            <a:r>
-              <a:rPr lang="en-US">
-                <a:ea typeface="+mn-lt"/>
-                <a:cs typeface="+mn-lt"/>
-              </a:rPr>
-              <a:t>Huggingface:  </a:t>
-            </a:r>
-            <a:r>
-              <a:rPr lang="en-US" dirty="0">
-                <a:ea typeface="+mn-lt"/>
-                <a:cs typeface="+mn-lt"/>
-                <a:hlinkClick r:id="rId6"/>
-              </a:rPr>
-              <a:t>PyTorch implementation of BERT</a:t>
-            </a:r>
-            <a:r>
-              <a:rPr lang="en-US" dirty="0">
-                <a:ea typeface="+mn-lt"/>
-                <a:cs typeface="+mn-lt"/>
-              </a:rPr>
-              <a:t>. </a:t>
-            </a:r>
+          <a:p>
+            <a:r>
+              <a:rPr lang="en-US" sz="1400"/>
+              <a:t>Layer 1</a:t>
+            </a:r>
+            <a:endParaRPr lang="en-US" sz="1400"/>
+          </a:p>
+        </p:txBody>
+      </p:sp>
+      <p:sp>
+        <p:nvSpPr>
+          <p:cNvPr id="10" name="Text Box 9"/>
+          <p:cNvSpPr txBox="1"/>
+          <p:nvPr/>
+        </p:nvSpPr>
+        <p:spPr>
+          <a:xfrm>
+            <a:off x="3387090" y="2390140"/>
+            <a:ext cx="768985" cy="306705"/>
+          </a:xfrm>
+          <a:prstGeom prst="rect">
+            <a:avLst/>
+          </a:prstGeom>
+          <a:noFill/>
+        </p:spPr>
+        <p:txBody>
+          <a:bodyPr wrap="none" rtlCol="0">
+            <a:spAutoFit/>
+          </a:bodyPr>
+          <a:p>
+            <a:r>
+              <a:rPr lang="en-US" sz="1400"/>
+              <a:t>Layer 2</a:t>
+            </a:r>
+            <a:endParaRPr lang="en-US" sz="1400"/>
+          </a:p>
+        </p:txBody>
+      </p:sp>
+      <p:sp>
+        <p:nvSpPr>
+          <p:cNvPr id="17" name="Text Box 16"/>
+          <p:cNvSpPr txBox="1"/>
+          <p:nvPr/>
+        </p:nvSpPr>
+        <p:spPr>
+          <a:xfrm>
+            <a:off x="4208145" y="3148965"/>
+            <a:ext cx="661035" cy="275590"/>
+          </a:xfrm>
+          <a:prstGeom prst="rect">
+            <a:avLst/>
+          </a:prstGeom>
+          <a:noFill/>
+        </p:spPr>
+        <p:txBody>
+          <a:bodyPr wrap="none" rtlCol="0">
+            <a:spAutoFit/>
+          </a:bodyPr>
+          <a:p>
+            <a:r>
+              <a:rPr lang="en-US" sz="1200"/>
+              <a:t>H</a:t>
+            </a:r>
+            <a:r>
+              <a:rPr lang="en-US" sz="1200" baseline="-25000"/>
+              <a:t>0</a:t>
+            </a:r>
+            <a:r>
+              <a:rPr lang="en-US" sz="1200" baseline="30000"/>
+              <a:t>(1)  </a:t>
+            </a:r>
+            <a:r>
+              <a:rPr lang="en-US" sz="1200"/>
+              <a:t>→</a:t>
+            </a:r>
+            <a:endParaRPr lang="en-US" sz="1200"/>
+          </a:p>
+        </p:txBody>
+      </p:sp>
+      <p:sp>
+        <p:nvSpPr>
+          <p:cNvPr id="19" name="Text Box 18"/>
+          <p:cNvSpPr txBox="1"/>
+          <p:nvPr/>
+        </p:nvSpPr>
+        <p:spPr>
+          <a:xfrm>
+            <a:off x="4208145" y="2436495"/>
+            <a:ext cx="661035" cy="275590"/>
+          </a:xfrm>
+          <a:prstGeom prst="rect">
+            <a:avLst/>
+          </a:prstGeom>
+          <a:noFill/>
+        </p:spPr>
+        <p:txBody>
+          <a:bodyPr wrap="none" rtlCol="0">
+            <a:spAutoFit/>
+          </a:bodyPr>
+          <a:p>
+            <a:r>
+              <a:rPr lang="en-US" sz="1200"/>
+              <a:t>H</a:t>
+            </a:r>
+            <a:r>
+              <a:rPr lang="en-US" sz="1200" baseline="-25000"/>
+              <a:t>0</a:t>
+            </a:r>
+            <a:r>
+              <a:rPr lang="en-US" sz="1200" baseline="30000"/>
+              <a:t>(2)  </a:t>
+            </a:r>
+            <a:r>
+              <a:rPr lang="en-US" sz="1200"/>
+              <a:t>→</a:t>
+            </a:r>
+            <a:endParaRPr lang="en-US" sz="1200"/>
+          </a:p>
+        </p:txBody>
+      </p:sp>
+      <p:sp>
+        <p:nvSpPr>
+          <p:cNvPr id="30" name="Text Box 29"/>
+          <p:cNvSpPr txBox="1"/>
+          <p:nvPr/>
+        </p:nvSpPr>
+        <p:spPr>
+          <a:xfrm>
+            <a:off x="7100570" y="1290320"/>
+            <a:ext cx="1701800" cy="398145"/>
+          </a:xfrm>
+          <a:prstGeom prst="rect">
+            <a:avLst/>
+          </a:prstGeom>
+          <a:solidFill>
+            <a:schemeClr val="accent4">
+              <a:lumMod val="60000"/>
+              <a:lumOff val="40000"/>
+            </a:schemeClr>
+          </a:solidFill>
+          <a:ln>
+            <a:solidFill>
+              <a:schemeClr val="tx1"/>
+            </a:solidFill>
+          </a:ln>
+        </p:spPr>
+        <p:txBody>
+          <a:bodyPr wrap="square" lIns="0" tIns="91440" rIns="0" bIns="91440" rtlCol="0">
+            <a:spAutoFit/>
+          </a:bodyPr>
+          <a:p>
+            <a:pPr algn="ctr"/>
+            <a:r>
+              <a:rPr lang="en-US" sz="1400"/>
+              <a:t>MLP+sigmoid</a:t>
+            </a:r>
+            <a:endParaRPr lang="en-US" sz="1400"/>
+          </a:p>
+        </p:txBody>
+      </p:sp>
+      <p:sp>
+        <p:nvSpPr>
+          <p:cNvPr id="15" name="Text Box 14"/>
+          <p:cNvSpPr txBox="1"/>
+          <p:nvPr/>
+        </p:nvSpPr>
+        <p:spPr>
+          <a:xfrm>
+            <a:off x="1438275" y="1256030"/>
+            <a:ext cx="2528570" cy="368300"/>
+          </a:xfrm>
+          <a:prstGeom prst="rect">
+            <a:avLst/>
+          </a:prstGeom>
+          <a:noFill/>
+        </p:spPr>
+        <p:txBody>
+          <a:bodyPr wrap="none" rtlCol="0">
+            <a:spAutoFit/>
+          </a:bodyPr>
+          <a:p>
+            <a:r>
+              <a:rPr lang="en-US" b="1"/>
+              <a:t>Feedforward network</a:t>
+            </a:r>
+            <a:endParaRPr lang="en-US" altLang="en-US" b="1"/>
+          </a:p>
+        </p:txBody>
+      </p:sp>
+      <p:pic>
+        <p:nvPicPr>
+          <p:cNvPr id="23" name="Picture 22"/>
+          <p:cNvPicPr>
+            <a:picLocks noChangeAspect="1"/>
+          </p:cNvPicPr>
+          <p:nvPr/>
+        </p:nvPicPr>
+        <p:blipFill>
+          <a:blip r:embed="rId4"/>
+          <a:srcRect l="81964" t="-74" b="64745"/>
+          <a:stretch>
+            <a:fillRect/>
+          </a:stretch>
+        </p:blipFill>
+        <p:spPr>
+          <a:xfrm>
+            <a:off x="7663815" y="952500"/>
+            <a:ext cx="606425" cy="303530"/>
+          </a:xfrm>
+          <a:prstGeom prst="rect">
+            <a:avLst/>
+          </a:prstGeom>
+        </p:spPr>
+      </p:pic>
+      <p:sp>
+        <p:nvSpPr>
+          <p:cNvPr id="34" name="Text Box 33"/>
+          <p:cNvSpPr txBox="1"/>
+          <p:nvPr/>
+        </p:nvSpPr>
+        <p:spPr>
+          <a:xfrm>
+            <a:off x="7552690" y="583565"/>
+            <a:ext cx="769620" cy="398145"/>
+          </a:xfrm>
+          <a:prstGeom prst="rect">
+            <a:avLst/>
+          </a:prstGeom>
+          <a:solidFill>
+            <a:schemeClr val="accent6">
+              <a:lumMod val="40000"/>
+              <a:lumOff val="60000"/>
+            </a:schemeClr>
+          </a:solidFill>
+          <a:ln>
+            <a:solidFill>
+              <a:schemeClr val="tx1"/>
+            </a:solidFill>
+          </a:ln>
+        </p:spPr>
+        <p:txBody>
+          <a:bodyPr wrap="square" lIns="0" tIns="91440" rIns="0" bIns="91440" rtlCol="0">
+            <a:spAutoFit/>
+          </a:bodyPr>
+          <a:p>
+            <a:pPr algn="ctr"/>
+            <a:r>
+              <a:rPr lang="en-US" sz="1400"/>
+              <a:t>Positive</a:t>
+            </a:r>
+            <a:endParaRPr lang="en-US" sz="1400"/>
+          </a:p>
+        </p:txBody>
+      </p:sp>
+      <p:sp>
+        <p:nvSpPr>
+          <p:cNvPr id="36" name="Rounded Rectangle 35"/>
+          <p:cNvSpPr/>
+          <p:nvPr/>
+        </p:nvSpPr>
+        <p:spPr>
+          <a:xfrm>
+            <a:off x="3183890" y="1979930"/>
+            <a:ext cx="5824855" cy="1893570"/>
+          </a:xfrm>
+          <a:prstGeom prst="roundRect">
+            <a:avLst/>
+          </a:prstGeom>
+          <a:solidFill>
+            <a:srgbClr val="00B0F0">
+              <a:alpha val="9000"/>
+            </a:srgbClr>
+          </a:solidFill>
+          <a:ln>
+            <a:solidFill>
+              <a:schemeClr val="bg1"/>
+            </a:solidFill>
+          </a:ln>
+        </p:spPr>
+        <p:style>
+          <a:lnRef idx="2">
+            <a:schemeClr val="accent1">
+              <a:shade val="50000"/>
+            </a:schemeClr>
+          </a:lnRef>
+          <a:fillRef idx="1">
+            <a:schemeClr val="accent1"/>
+          </a:fillRef>
+          <a:effectRef idx="0">
+            <a:schemeClr val="accent1"/>
+          </a:effectRef>
+          <a:fontRef idx="minor">
+            <a:schemeClr val="lt1"/>
+          </a:fontRef>
+        </p:style>
+        <p:txBody>
+          <a:bodyPr rtlCol="0" anchor="ctr"/>
+          <a:p>
+            <a:pPr algn="ctr"/>
             <a:endParaRPr lang="en-US"/>
           </a:p>
-          <a:p>
-            <a:pPr lvl="2"/>
-            <a:r>
-              <a:rPr lang="en-US" dirty="0">
-                <a:ea typeface="+mn-lt"/>
-                <a:cs typeface="+mn-lt"/>
-                <a:hlinkClick r:id="rId7"/>
-              </a:rPr>
-              <a:t>AllenNLP</a:t>
-            </a:r>
-            <a:r>
-              <a:rPr lang="en-US" dirty="0">
-                <a:ea typeface="+mn-lt"/>
-                <a:cs typeface="+mn-lt"/>
-              </a:rPr>
-              <a:t> library </a:t>
-            </a:r>
-            <a:r>
-              <a:rPr lang="en-US" dirty="0">
-                <a:ea typeface="+mn-lt"/>
-                <a:cs typeface="+mn-lt"/>
-                <a:hlinkClick r:id="rId8"/>
-              </a:rPr>
-              <a:t>allow using BERT embeddings</a:t>
-            </a:r>
-            <a:r>
-              <a:rPr lang="en-US" dirty="0">
-                <a:ea typeface="+mn-lt"/>
-                <a:cs typeface="+mn-lt"/>
-              </a:rPr>
-              <a:t> with any model.</a:t>
-            </a:r>
-            <a:endParaRPr lang="en-US" dirty="0">
-              <a:ea typeface="Calibri"/>
-              <a:cs typeface="Calibri"/>
-            </a:endParaRPr>
-          </a:p>
-          <a:p>
-            <a:endParaRPr lang="en-US" dirty="0">
-              <a:ea typeface="Calibri"/>
-              <a:cs typeface="Calibri"/>
-            </a:endParaRPr>
+        </p:txBody>
+      </p:sp>
+      <p:sp>
+        <p:nvSpPr>
+          <p:cNvPr id="37" name="Text Box 36"/>
+          <p:cNvSpPr txBox="1"/>
+          <p:nvPr/>
+        </p:nvSpPr>
+        <p:spPr>
+          <a:xfrm>
+            <a:off x="1438275" y="2712085"/>
+            <a:ext cx="687070" cy="368300"/>
+          </a:xfrm>
+          <a:prstGeom prst="rect">
+            <a:avLst/>
+          </a:prstGeom>
+          <a:noFill/>
+        </p:spPr>
+        <p:txBody>
+          <a:bodyPr wrap="none" rtlCol="0">
+            <a:spAutoFit/>
+          </a:bodyPr>
+          <a:p>
+            <a:r>
+              <a:rPr lang="en-US" b="1"/>
+              <a:t>RNN</a:t>
+            </a:r>
+            <a:endParaRPr lang="en-US" b="1"/>
+          </a:p>
+        </p:txBody>
+      </p:sp>
+      <p:cxnSp>
+        <p:nvCxnSpPr>
+          <p:cNvPr id="18" name="Straight Arrow Connector 17"/>
+          <p:cNvCxnSpPr>
+            <a:endCxn id="6" idx="2"/>
+          </p:cNvCxnSpPr>
+          <p:nvPr/>
+        </p:nvCxnSpPr>
+        <p:spPr>
+          <a:xfrm flipV="1">
+            <a:off x="6096635" y="5869940"/>
+            <a:ext cx="0" cy="302895"/>
+          </a:xfrm>
+          <a:prstGeom prst="straightConnector1">
+            <a:avLst/>
+          </a:prstGeom>
+          <a:ln>
+            <a:tailEnd type="arrow" w="med" len="med"/>
+          </a:ln>
+        </p:spPr>
+        <p:style>
+          <a:lnRef idx="1">
+            <a:schemeClr val="dk1"/>
+          </a:lnRef>
+          <a:fillRef idx="0">
+            <a:schemeClr val="dk1"/>
+          </a:fillRef>
+          <a:effectRef idx="0">
+            <a:schemeClr val="dk1"/>
+          </a:effectRef>
+          <a:fontRef idx="minor">
+            <a:schemeClr val="tx1"/>
+          </a:fontRef>
+        </p:style>
+      </p:cxnSp>
+      <p:cxnSp>
+        <p:nvCxnSpPr>
+          <p:cNvPr id="21" name="Straight Arrow Connector 20"/>
+          <p:cNvCxnSpPr/>
+          <p:nvPr/>
+        </p:nvCxnSpPr>
+        <p:spPr>
+          <a:xfrm flipV="1">
+            <a:off x="6096635" y="4452620"/>
+            <a:ext cx="635" cy="357505"/>
+          </a:xfrm>
+          <a:prstGeom prst="straightConnector1">
+            <a:avLst/>
+          </a:prstGeom>
+          <a:ln>
+            <a:tailEnd type="arrow" w="med" len="med"/>
+          </a:ln>
+        </p:spPr>
+        <p:style>
+          <a:lnRef idx="1">
+            <a:schemeClr val="dk1"/>
+          </a:lnRef>
+          <a:fillRef idx="0">
+            <a:schemeClr val="dk1"/>
+          </a:fillRef>
+          <a:effectRef idx="0">
+            <a:schemeClr val="dk1"/>
+          </a:effectRef>
+          <a:fontRef idx="minor">
+            <a:schemeClr val="tx1"/>
+          </a:fontRef>
+        </p:style>
+      </p:cxnSp>
+      <p:cxnSp>
+        <p:nvCxnSpPr>
+          <p:cNvPr id="22" name="Straight Arrow Connector 21"/>
+          <p:cNvCxnSpPr/>
+          <p:nvPr/>
+        </p:nvCxnSpPr>
+        <p:spPr>
+          <a:xfrm flipV="1">
+            <a:off x="7937500" y="1682750"/>
+            <a:ext cx="0" cy="702310"/>
+          </a:xfrm>
+          <a:prstGeom prst="straightConnector1">
+            <a:avLst/>
+          </a:prstGeom>
+          <a:ln w="38100">
+            <a:tailEnd type="arrow" w="med" len="med"/>
+          </a:ln>
+        </p:spPr>
+        <p:style>
+          <a:lnRef idx="1">
+            <a:schemeClr val="dk1"/>
+          </a:lnRef>
+          <a:fillRef idx="0">
+            <a:schemeClr val="dk1"/>
+          </a:fillRef>
+          <a:effectRef idx="0">
+            <a:schemeClr val="dk1"/>
+          </a:effectRef>
+          <a:fontRef idx="minor">
+            <a:schemeClr val="tx1"/>
+          </a:fontRef>
+        </p:style>
+      </p:cxnSp>
+      <p:sp>
+        <p:nvSpPr>
+          <p:cNvPr id="40" name="Text Box 39"/>
+          <p:cNvSpPr txBox="1"/>
+          <p:nvPr/>
+        </p:nvSpPr>
+        <p:spPr>
+          <a:xfrm>
+            <a:off x="1438275" y="5198745"/>
+            <a:ext cx="1884045" cy="368300"/>
+          </a:xfrm>
+          <a:prstGeom prst="rect">
+            <a:avLst/>
+          </a:prstGeom>
+          <a:noFill/>
+        </p:spPr>
+        <p:txBody>
+          <a:bodyPr wrap="none" rtlCol="0">
+            <a:spAutoFit/>
+          </a:bodyPr>
+          <a:p>
+            <a:r>
+              <a:rPr lang="en-US"/>
+              <a:t>Pretrained BERT</a:t>
+            </a:r>
+            <a:endParaRPr lang="en-US"/>
           </a:p>
         </p:txBody>
       </p:sp>
@@ -5913,6 +6958,13 @@
     <a:masterClrMapping/>
   </p:clrMapOvr>
 </p:sld>
+</file>
+
+<file path=ppt/tags/tag1.xml><?xml version="1.0" encoding="utf-8"?>
+<p:tagLst xmlns:p="http://schemas.openxmlformats.org/presentationml/2006/main">
+  <p:tag name="TABLE_ENDDRAG_ORIGIN_RECT" val="591*194"/>
+  <p:tag name="TABLE_ENDDRAG_RECT" val="169*314*591*194"/>
+</p:tagLst>
 </file>
 
 <file path=ppt/theme/theme1.xml><?xml version="1.0" encoding="utf-8"?>

</xml_diff>